<commit_message>
final outpus for preprint paper
</commit_message>
<xml_diff>
--- a/figures/figure_curation.pptx
+++ b/figures/figure_curation.pptx
@@ -10,6 +10,7 @@
     <p:sldId id="258" r:id="rId4"/>
     <p:sldId id="259" r:id="rId5"/>
     <p:sldId id="260" r:id="rId6"/>
+    <p:sldId id="261" r:id="rId7"/>
   </p:sldIdLst>
   <p:sldSz cx="12192000" cy="6858000"/>
   <p:notesSz cx="6858000" cy="9144000"/>
@@ -108,7 +109,104 @@
       </a:defRPr>
     </a:lvl9pPr>
   </p:defaultTextStyle>
+  <p:extLst>
+    <p:ext uri="{EFAFB233-063F-42B5-8137-9DF3F51BA10A}">
+      <p15:sldGuideLst xmlns:p15="http://schemas.microsoft.com/office/powerpoint/2012/main"/>
+    </p:ext>
+  </p:extLst>
 </p:presentation>
+</file>
+
+<file path=ppt/revisionInfo.xml><?xml version="1.0" encoding="utf-8"?>
+<p1510:revInfo xmlns:a="http://schemas.openxmlformats.org/drawingml/2006/main" xmlns:r="http://schemas.openxmlformats.org/officeDocument/2006/relationships" xmlns:p1510="http://schemas.microsoft.com/office/powerpoint/2015/10/main">
+  <p1510:revLst>
+    <p1510:client id="{00ACF8BF-6221-3647-AE6C-AC6F12225312}" v="8" dt="2021-11-19T04:07:26.025"/>
+  </p1510:revLst>
+</p1510:revInfo>
+</file>
+
+<file path=ppt/changesInfos/changesInfo1.xml><?xml version="1.0" encoding="utf-8"?>
+<pc:chgInfo xmlns:a="http://schemas.openxmlformats.org/drawingml/2006/main" xmlns:r="http://schemas.openxmlformats.org/officeDocument/2006/relationships" xmlns:ac="http://schemas.microsoft.com/office/drawing/2013/main/command" xmlns:pc="http://schemas.microsoft.com/office/powerpoint/2013/main/command">
+  <pc:docChgLst>
+    <pc:chgData name="Aime Nishimwe" userId="3b03406e-fa29-4aa8-ac41-df3f1195c3ac" providerId="ADAL" clId="{00ACF8BF-6221-3647-AE6C-AC6F12225312}"/>
+    <pc:docChg chg="custSel addSld modSld">
+      <pc:chgData name="Aime Nishimwe" userId="3b03406e-fa29-4aa8-ac41-df3f1195c3ac" providerId="ADAL" clId="{00ACF8BF-6221-3647-AE6C-AC6F12225312}" dt="2021-11-19T04:07:28.265" v="54" actId="962"/>
+      <pc:docMkLst>
+        <pc:docMk/>
+      </pc:docMkLst>
+      <pc:sldChg chg="addSp delSp modSp mod">
+        <pc:chgData name="Aime Nishimwe" userId="3b03406e-fa29-4aa8-ac41-df3f1195c3ac" providerId="ADAL" clId="{00ACF8BF-6221-3647-AE6C-AC6F12225312}" dt="2021-11-19T04:07:28.265" v="54" actId="962"/>
+        <pc:sldMkLst>
+          <pc:docMk/>
+          <pc:sldMk cId="997385416" sldId="259"/>
+        </pc:sldMkLst>
+        <pc:spChg chg="add mod topLvl">
+          <ac:chgData name="Aime Nishimwe" userId="3b03406e-fa29-4aa8-ac41-df3f1195c3ac" providerId="ADAL" clId="{00ACF8BF-6221-3647-AE6C-AC6F12225312}" dt="2021-11-19T04:05:46.121" v="44" actId="1076"/>
+          <ac:spMkLst>
+            <pc:docMk/>
+            <pc:sldMk cId="997385416" sldId="259"/>
+            <ac:spMk id="2" creationId="{40DF0CB3-3E5C-F94C-9C8A-B232C6A0FB24}"/>
+          </ac:spMkLst>
+        </pc:spChg>
+        <pc:spChg chg="add mod topLvl">
+          <ac:chgData name="Aime Nishimwe" userId="3b03406e-fa29-4aa8-ac41-df3f1195c3ac" providerId="ADAL" clId="{00ACF8BF-6221-3647-AE6C-AC6F12225312}" dt="2021-11-19T04:05:46.121" v="44" actId="1076"/>
+          <ac:spMkLst>
+            <pc:docMk/>
+            <pc:sldMk cId="997385416" sldId="259"/>
+            <ac:spMk id="5" creationId="{90752FA1-A228-9F4F-A11F-2DDD817BD1B8}"/>
+          </ac:spMkLst>
+        </pc:spChg>
+        <pc:grpChg chg="add del">
+          <ac:chgData name="Aime Nishimwe" userId="3b03406e-fa29-4aa8-ac41-df3f1195c3ac" providerId="ADAL" clId="{00ACF8BF-6221-3647-AE6C-AC6F12225312}" dt="2021-11-18T16:20:08.149" v="20" actId="165"/>
+          <ac:grpSpMkLst>
+            <pc:docMk/>
+            <pc:sldMk cId="997385416" sldId="259"/>
+            <ac:grpSpMk id="6" creationId="{92394EB3-8945-3B4C-B62C-8AD7C7C29305}"/>
+          </ac:grpSpMkLst>
+        </pc:grpChg>
+        <pc:grpChg chg="add mod">
+          <ac:chgData name="Aime Nishimwe" userId="3b03406e-fa29-4aa8-ac41-df3f1195c3ac" providerId="ADAL" clId="{00ACF8BF-6221-3647-AE6C-AC6F12225312}" dt="2021-11-19T04:06:45.814" v="51" actId="14100"/>
+          <ac:grpSpMkLst>
+            <pc:docMk/>
+            <pc:sldMk cId="997385416" sldId="259"/>
+            <ac:grpSpMk id="7" creationId="{C42D1A15-93C4-874F-9F28-977AB59BA1E0}"/>
+          </ac:grpSpMkLst>
+        </pc:grpChg>
+        <pc:picChg chg="mod topLvl">
+          <ac:chgData name="Aime Nishimwe" userId="3b03406e-fa29-4aa8-ac41-df3f1195c3ac" providerId="ADAL" clId="{00ACF8BF-6221-3647-AE6C-AC6F12225312}" dt="2021-11-19T03:50:11.136" v="32" actId="1076"/>
+          <ac:picMkLst>
+            <pc:docMk/>
+            <pc:sldMk cId="997385416" sldId="259"/>
+            <ac:picMk id="3" creationId="{E1E14964-D8E4-C348-AF3C-079FCB7AFEA8}"/>
+          </ac:picMkLst>
+        </pc:picChg>
+        <pc:picChg chg="add mod topLvl">
+          <ac:chgData name="Aime Nishimwe" userId="3b03406e-fa29-4aa8-ac41-df3f1195c3ac" providerId="ADAL" clId="{00ACF8BF-6221-3647-AE6C-AC6F12225312}" dt="2021-11-19T03:50:44.936" v="39" actId="1076"/>
+          <ac:picMkLst>
+            <pc:docMk/>
+            <pc:sldMk cId="997385416" sldId="259"/>
+            <ac:picMk id="4" creationId="{21E8A73D-A7F4-C841-BABC-88C1CC341D9A}"/>
+          </ac:picMkLst>
+        </pc:picChg>
+        <pc:picChg chg="add mod">
+          <ac:chgData name="Aime Nishimwe" userId="3b03406e-fa29-4aa8-ac41-df3f1195c3ac" providerId="ADAL" clId="{00ACF8BF-6221-3647-AE6C-AC6F12225312}" dt="2021-11-19T04:07:28.265" v="54" actId="962"/>
+          <ac:picMkLst>
+            <pc:docMk/>
+            <pc:sldMk cId="997385416" sldId="259"/>
+            <ac:picMk id="9" creationId="{B36FBAA9-F318-4843-A4A4-65850B1FF5DC}"/>
+          </ac:picMkLst>
+        </pc:picChg>
+      </pc:sldChg>
+      <pc:sldChg chg="add">
+        <pc:chgData name="Aime Nishimwe" userId="3b03406e-fa29-4aa8-ac41-df3f1195c3ac" providerId="ADAL" clId="{00ACF8BF-6221-3647-AE6C-AC6F12225312}" dt="2021-11-19T03:51:13.957" v="40" actId="2890"/>
+        <pc:sldMkLst>
+          <pc:docMk/>
+          <pc:sldMk cId="874257640" sldId="261"/>
+        </pc:sldMkLst>
+      </pc:sldChg>
+    </pc:docChg>
+  </pc:docChgLst>
+</pc:chgInfo>
 </file>
 
 <file path=ppt/slideLayouts/slideLayout1.xml><?xml version="1.0" encoding="utf-8"?>
@@ -258,7 +356,7 @@
           <a:p>
             <a:fld id="{D7132735-3076-8248-B3C0-FEC0F3CD9045}" type="datetimeFigureOut">
               <a:rPr lang="en-US" smtClean="0"/>
-              <a:t>11/16/21</a:t>
+              <a:t>11/18/21</a:t>
             </a:fld>
             <a:endParaRPr lang="en-US"/>
           </a:p>
@@ -456,7 +554,7 @@
           <a:p>
             <a:fld id="{D7132735-3076-8248-B3C0-FEC0F3CD9045}" type="datetimeFigureOut">
               <a:rPr lang="en-US" smtClean="0"/>
-              <a:t>11/16/21</a:t>
+              <a:t>11/18/21</a:t>
             </a:fld>
             <a:endParaRPr lang="en-US"/>
           </a:p>
@@ -664,7 +762,7 @@
           <a:p>
             <a:fld id="{D7132735-3076-8248-B3C0-FEC0F3CD9045}" type="datetimeFigureOut">
               <a:rPr lang="en-US" smtClean="0"/>
-              <a:t>11/16/21</a:t>
+              <a:t>11/18/21</a:t>
             </a:fld>
             <a:endParaRPr lang="en-US"/>
           </a:p>
@@ -862,7 +960,7 @@
           <a:p>
             <a:fld id="{D7132735-3076-8248-B3C0-FEC0F3CD9045}" type="datetimeFigureOut">
               <a:rPr lang="en-US" smtClean="0"/>
-              <a:t>11/16/21</a:t>
+              <a:t>11/18/21</a:t>
             </a:fld>
             <a:endParaRPr lang="en-US"/>
           </a:p>
@@ -1137,7 +1235,7 @@
           <a:p>
             <a:fld id="{D7132735-3076-8248-B3C0-FEC0F3CD9045}" type="datetimeFigureOut">
               <a:rPr lang="en-US" smtClean="0"/>
-              <a:t>11/16/21</a:t>
+              <a:t>11/18/21</a:t>
             </a:fld>
             <a:endParaRPr lang="en-US"/>
           </a:p>
@@ -1402,7 +1500,7 @@
           <a:p>
             <a:fld id="{D7132735-3076-8248-B3C0-FEC0F3CD9045}" type="datetimeFigureOut">
               <a:rPr lang="en-US" smtClean="0"/>
-              <a:t>11/16/21</a:t>
+              <a:t>11/18/21</a:t>
             </a:fld>
             <a:endParaRPr lang="en-US"/>
           </a:p>
@@ -1814,7 +1912,7 @@
           <a:p>
             <a:fld id="{D7132735-3076-8248-B3C0-FEC0F3CD9045}" type="datetimeFigureOut">
               <a:rPr lang="en-US" smtClean="0"/>
-              <a:t>11/16/21</a:t>
+              <a:t>11/18/21</a:t>
             </a:fld>
             <a:endParaRPr lang="en-US"/>
           </a:p>
@@ -1955,7 +2053,7 @@
           <a:p>
             <a:fld id="{D7132735-3076-8248-B3C0-FEC0F3CD9045}" type="datetimeFigureOut">
               <a:rPr lang="en-US" smtClean="0"/>
-              <a:t>11/16/21</a:t>
+              <a:t>11/18/21</a:t>
             </a:fld>
             <a:endParaRPr lang="en-US"/>
           </a:p>
@@ -2068,7 +2166,7 @@
           <a:p>
             <a:fld id="{D7132735-3076-8248-B3C0-FEC0F3CD9045}" type="datetimeFigureOut">
               <a:rPr lang="en-US" smtClean="0"/>
-              <a:t>11/16/21</a:t>
+              <a:t>11/18/21</a:t>
             </a:fld>
             <a:endParaRPr lang="en-US"/>
           </a:p>
@@ -2379,7 +2477,7 @@
           <a:p>
             <a:fld id="{D7132735-3076-8248-B3C0-FEC0F3CD9045}" type="datetimeFigureOut">
               <a:rPr lang="en-US" smtClean="0"/>
-              <a:t>11/16/21</a:t>
+              <a:t>11/18/21</a:t>
             </a:fld>
             <a:endParaRPr lang="en-US"/>
           </a:p>
@@ -2667,7 +2765,7 @@
           <a:p>
             <a:fld id="{D7132735-3076-8248-B3C0-FEC0F3CD9045}" type="datetimeFigureOut">
               <a:rPr lang="en-US" smtClean="0"/>
-              <a:t>11/16/21</a:t>
+              <a:t>11/18/21</a:t>
             </a:fld>
             <a:endParaRPr lang="en-US"/>
           </a:p>
@@ -2908,7 +3006,7 @@
           <a:p>
             <a:fld id="{D7132735-3076-8248-B3C0-FEC0F3CD9045}" type="datetimeFigureOut">
               <a:rPr lang="en-US" smtClean="0"/>
-              <a:t>11/16/21</a:t>
+              <a:t>11/18/21</a:t>
             </a:fld>
             <a:endParaRPr lang="en-US"/>
           </a:p>
@@ -4224,12 +4322,163 @@
           <a:chExt cx="0" cy="0"/>
         </a:xfrm>
       </p:grpSpPr>
+      <p:grpSp>
+        <p:nvGrpSpPr>
+          <p:cNvPr id="7" name="Group 6">
+            <a:extLst>
+              <a:ext uri="{FF2B5EF4-FFF2-40B4-BE49-F238E27FC236}">
+                <a16:creationId xmlns:a16="http://schemas.microsoft.com/office/drawing/2014/main" id="{C42D1A15-93C4-874F-9F28-977AB59BA1E0}"/>
+              </a:ext>
+            </a:extLst>
+          </p:cNvPr>
+          <p:cNvGrpSpPr/>
+          <p:nvPr/>
+        </p:nvGrpSpPr>
+        <p:grpSpPr>
+          <a:xfrm>
+            <a:off x="969973" y="1653736"/>
+            <a:ext cx="10149840" cy="2985479"/>
+            <a:chOff x="1474470" y="1653737"/>
+            <a:chExt cx="10534986" cy="2985479"/>
+          </a:xfrm>
+        </p:grpSpPr>
+        <p:pic>
+          <p:nvPicPr>
+            <p:cNvPr id="3" name="Picture 2">
+              <a:extLst>
+                <a:ext uri="{FF2B5EF4-FFF2-40B4-BE49-F238E27FC236}">
+                  <a16:creationId xmlns:a16="http://schemas.microsoft.com/office/drawing/2014/main" id="{E1E14964-D8E4-C348-AF3C-079FCB7AFEA8}"/>
+                </a:ext>
+              </a:extLst>
+            </p:cNvPr>
+            <p:cNvPicPr>
+              <a:picLocks noChangeAspect="1"/>
+            </p:cNvPicPr>
+            <p:nvPr/>
+          </p:nvPicPr>
+          <p:blipFill>
+            <a:blip r:embed="rId2"/>
+            <a:srcRect/>
+            <a:stretch/>
+          </p:blipFill>
+          <p:spPr>
+            <a:xfrm>
+              <a:off x="1474470" y="1889522"/>
+              <a:ext cx="4043668" cy="2749694"/>
+            </a:xfrm>
+            <a:prstGeom prst="rect">
+              <a:avLst/>
+            </a:prstGeom>
+          </p:spPr>
+        </p:pic>
+        <p:pic>
+          <p:nvPicPr>
+            <p:cNvPr id="4" name="Picture 3">
+              <a:extLst>
+                <a:ext uri="{FF2B5EF4-FFF2-40B4-BE49-F238E27FC236}">
+                  <a16:creationId xmlns:a16="http://schemas.microsoft.com/office/drawing/2014/main" id="{21E8A73D-A7F4-C841-BABC-88C1CC341D9A}"/>
+                </a:ext>
+              </a:extLst>
+            </p:cNvPr>
+            <p:cNvPicPr>
+              <a:picLocks noChangeAspect="1"/>
+            </p:cNvPicPr>
+            <p:nvPr/>
+          </p:nvPicPr>
+          <p:blipFill>
+            <a:blip r:embed="rId3"/>
+            <a:srcRect/>
+            <a:stretch/>
+          </p:blipFill>
+          <p:spPr>
+            <a:xfrm>
+              <a:off x="5628497" y="1976903"/>
+              <a:ext cx="6380959" cy="2574931"/>
+            </a:xfrm>
+            <a:prstGeom prst="rect">
+              <a:avLst/>
+            </a:prstGeom>
+          </p:spPr>
+        </p:pic>
+        <p:sp>
+          <p:nvSpPr>
+            <p:cNvPr id="2" name="TextBox 1">
+              <a:extLst>
+                <a:ext uri="{FF2B5EF4-FFF2-40B4-BE49-F238E27FC236}">
+                  <a16:creationId xmlns:a16="http://schemas.microsoft.com/office/drawing/2014/main" id="{40DF0CB3-3E5C-F94C-9C8A-B232C6A0FB24}"/>
+                </a:ext>
+              </a:extLst>
+            </p:cNvPr>
+            <p:cNvSpPr txBox="1"/>
+            <p:nvPr/>
+          </p:nvSpPr>
+          <p:spPr>
+            <a:xfrm>
+              <a:off x="1474470" y="1751022"/>
+              <a:ext cx="720090" cy="276999"/>
+            </a:xfrm>
+            <a:prstGeom prst="rect">
+              <a:avLst/>
+            </a:prstGeom>
+            <a:noFill/>
+          </p:spPr>
+          <p:txBody>
+            <a:bodyPr wrap="square" rtlCol="0">
+              <a:spAutoFit/>
+            </a:bodyPr>
+            <a:lstStyle/>
+            <a:p>
+              <a:r>
+                <a:rPr lang="en-US" sz="1200" dirty="0">
+                  <a:latin typeface="Helvetica" pitchFamily="2" charset="0"/>
+                </a:rPr>
+                <a:t>A</a:t>
+              </a:r>
+            </a:p>
+          </p:txBody>
+        </p:sp>
+        <p:sp>
+          <p:nvSpPr>
+            <p:cNvPr id="5" name="TextBox 4">
+              <a:extLst>
+                <a:ext uri="{FF2B5EF4-FFF2-40B4-BE49-F238E27FC236}">
+                  <a16:creationId xmlns:a16="http://schemas.microsoft.com/office/drawing/2014/main" id="{90752FA1-A228-9F4F-A11F-2DDD817BD1B8}"/>
+                </a:ext>
+              </a:extLst>
+            </p:cNvPr>
+            <p:cNvSpPr txBox="1"/>
+            <p:nvPr/>
+          </p:nvSpPr>
+          <p:spPr>
+            <a:xfrm>
+              <a:off x="5878183" y="1653737"/>
+              <a:ext cx="720090" cy="276999"/>
+            </a:xfrm>
+            <a:prstGeom prst="rect">
+              <a:avLst/>
+            </a:prstGeom>
+            <a:noFill/>
+          </p:spPr>
+          <p:txBody>
+            <a:bodyPr wrap="square" rtlCol="0">
+              <a:spAutoFit/>
+            </a:bodyPr>
+            <a:lstStyle/>
+            <a:p>
+              <a:r>
+                <a:rPr lang="en-US" sz="1200" dirty="0"/>
+                <a:t>B</a:t>
+              </a:r>
+            </a:p>
+          </p:txBody>
+        </p:sp>
+      </p:grpSp>
       <p:pic>
         <p:nvPicPr>
-          <p:cNvPr id="3" name="Picture 2" descr="Chart, histogram&#10;&#10;Description automatically generated">
-            <a:extLst>
-              <a:ext uri="{FF2B5EF4-FFF2-40B4-BE49-F238E27FC236}">
-                <a16:creationId xmlns:a16="http://schemas.microsoft.com/office/drawing/2014/main" id="{E1E14964-D8E4-C348-AF3C-079FCB7AFEA8}"/>
+          <p:cNvPr id="9" name="Picture 8" descr="Graphical user interface, chart, line chart&#10;&#10;Description automatically generated">
+            <a:extLst>
+              <a:ext uri="{FF2B5EF4-FFF2-40B4-BE49-F238E27FC236}">
+                <a16:creationId xmlns:a16="http://schemas.microsoft.com/office/drawing/2014/main" id="{B36FBAA9-F318-4843-A4A4-65850B1FF5DC}"/>
               </a:ext>
             </a:extLst>
           </p:cNvPr>
@@ -4239,15 +4488,15 @@
           <p:nvPr/>
         </p:nvPicPr>
         <p:blipFill>
-          <a:blip r:embed="rId2"/>
+          <a:blip r:embed="rId4"/>
           <a:stretch>
             <a:fillRect/>
           </a:stretch>
         </p:blipFill>
         <p:spPr>
           <a:xfrm>
-            <a:off x="1508579" y="532493"/>
-            <a:ext cx="8826500" cy="4254500"/>
+            <a:off x="1949450" y="2241550"/>
+            <a:ext cx="8293100" cy="2374900"/>
           </a:xfrm>
           <a:prstGeom prst="rect">
             <a:avLst/>
@@ -4326,6 +4575,74 @@
     <p:extLst>
       <p:ext uri="{BB962C8B-B14F-4D97-AF65-F5344CB8AC3E}">
         <p14:creationId xmlns:p14="http://schemas.microsoft.com/office/powerpoint/2010/main" val="300801378"/>
+      </p:ext>
+    </p:extLst>
+  </p:cSld>
+  <p:clrMapOvr>
+    <a:masterClrMapping/>
+  </p:clrMapOvr>
+</p:sld>
+</file>
+
+<file path=ppt/slides/slide6.xml><?xml version="1.0" encoding="utf-8"?>
+<p:sld xmlns:a="http://schemas.openxmlformats.org/drawingml/2006/main" xmlns:r="http://schemas.openxmlformats.org/officeDocument/2006/relationships" xmlns:p="http://schemas.openxmlformats.org/presentationml/2006/main">
+  <p:cSld>
+    <p:bg>
+      <p:bgPr>
+        <a:solidFill>
+          <a:schemeClr val="bg1"/>
+        </a:solidFill>
+        <a:effectLst/>
+      </p:bgPr>
+    </p:bg>
+    <p:spTree>
+      <p:nvGrpSpPr>
+        <p:cNvPr id="1" name=""/>
+        <p:cNvGrpSpPr/>
+        <p:nvPr/>
+      </p:nvGrpSpPr>
+      <p:grpSpPr>
+        <a:xfrm>
+          <a:off x="0" y="0"/>
+          <a:ext cx="0" cy="0"/>
+          <a:chOff x="0" y="0"/>
+          <a:chExt cx="0" cy="0"/>
+        </a:xfrm>
+      </p:grpSpPr>
+      <p:pic>
+        <p:nvPicPr>
+          <p:cNvPr id="4" name="Picture 3" descr="Chart, line chart&#10;&#10;Description automatically generated">
+            <a:extLst>
+              <a:ext uri="{FF2B5EF4-FFF2-40B4-BE49-F238E27FC236}">
+                <a16:creationId xmlns:a16="http://schemas.microsoft.com/office/drawing/2014/main" id="{D6DABEC7-6582-BD4D-80A3-CAA7A87B5474}"/>
+              </a:ext>
+            </a:extLst>
+          </p:cNvPr>
+          <p:cNvPicPr>
+            <a:picLocks noChangeAspect="1"/>
+          </p:cNvPicPr>
+          <p:nvPr/>
+        </p:nvPicPr>
+        <p:blipFill>
+          <a:blip r:embed="rId2"/>
+          <a:stretch>
+            <a:fillRect/>
+          </a:stretch>
+        </p:blipFill>
+        <p:spPr>
+          <a:xfrm>
+            <a:off x="564650" y="696684"/>
+            <a:ext cx="11062699" cy="4307807"/>
+          </a:xfrm>
+          <a:prstGeom prst="rect">
+            <a:avLst/>
+          </a:prstGeom>
+        </p:spPr>
+      </p:pic>
+    </p:spTree>
+    <p:extLst>
+      <p:ext uri="{BB962C8B-B14F-4D97-AF65-F5344CB8AC3E}">
+        <p14:creationId xmlns:p14="http://schemas.microsoft.com/office/powerpoint/2010/main" val="874257640"/>
       </p:ext>
     </p:extLst>
   </p:cSld>

</xml_diff>